<commit_message>
Remove 'By' on author line
</commit_message>
<xml_diff>
--- a/assets/og-image-background.pptx
+++ b/assets/og-image-background.pptx
@@ -104,6 +104,11 @@
       </a:defRPr>
     </a:lvl9pPr>
   </p:defaultTextStyle>
+  <p:extLst>
+    <p:ext uri="{EFAFB233-063F-42B5-8137-9DF3F51BA10A}">
+      <p15:sldGuideLst xmlns:p15="http://schemas.microsoft.com/office/powerpoint/2012/main"/>
+    </p:ext>
+  </p:extLst>
 </p:presentation>
 </file>
 
@@ -3486,7 +3491,7 @@
                   </a:solidFill>
                   <a:latin typeface="Optima" panose="02000503060000020004" pitchFamily="2" charset="0"/>
                 </a:rPr>
-                <a:t>By Steve </a:t>
+                <a:t>Steve </a:t>
               </a:r>
               <a:r>
                 <a:rPr lang="en-US" sz="3200" i="1" dirty="0" err="1">

</xml_diff>